<commit_message>
Make suggested changes by TA
</commit_message>
<xml_diff>
--- a/docs/diagrams/Diagrams-Model.pptx
+++ b/docs/diagrams/Diagrams-Model.pptx
@@ -208,7 +208,7 @@
           <a:p>
             <a:fld id="{F5CC4B3F-88C1-4FFA-B1B6-F41C21DC6924}" type="datetimeFigureOut">
               <a:rPr lang="en-US" smtClean="0"/>
-              <a:t>10/10/2016</a:t>
+              <a:t>10/25/2016</a:t>
             </a:fld>
             <a:endParaRPr lang="en-US"/>
           </a:p>
@@ -654,7 +654,7 @@
           <a:p>
             <a:fld id="{78C97017-6FC3-485B-9764-EAC9E56C1D49}" type="datetimeFigureOut">
               <a:rPr lang="en-US" smtClean="0"/>
-              <a:t>10/10/2016</a:t>
+              <a:t>10/25/2016</a:t>
             </a:fld>
             <a:endParaRPr lang="en-US"/>
           </a:p>
@@ -822,7 +822,7 @@
           <a:p>
             <a:fld id="{78C97017-6FC3-485B-9764-EAC9E56C1D49}" type="datetimeFigureOut">
               <a:rPr lang="en-US" smtClean="0"/>
-              <a:t>10/10/2016</a:t>
+              <a:t>10/25/2016</a:t>
             </a:fld>
             <a:endParaRPr lang="en-US"/>
           </a:p>
@@ -1000,7 +1000,7 @@
           <a:p>
             <a:fld id="{78C97017-6FC3-485B-9764-EAC9E56C1D49}" type="datetimeFigureOut">
               <a:rPr lang="en-US" smtClean="0"/>
-              <a:t>10/10/2016</a:t>
+              <a:t>10/25/2016</a:t>
             </a:fld>
             <a:endParaRPr lang="en-US"/>
           </a:p>
@@ -1168,7 +1168,7 @@
           <a:p>
             <a:fld id="{78C97017-6FC3-485B-9764-EAC9E56C1D49}" type="datetimeFigureOut">
               <a:rPr lang="en-US" smtClean="0"/>
-              <a:t>10/10/2016</a:t>
+              <a:t>10/25/2016</a:t>
             </a:fld>
             <a:endParaRPr lang="en-US"/>
           </a:p>
@@ -1413,7 +1413,7 @@
           <a:p>
             <a:fld id="{78C97017-6FC3-485B-9764-EAC9E56C1D49}" type="datetimeFigureOut">
               <a:rPr lang="en-US" smtClean="0"/>
-              <a:t>10/10/2016</a:t>
+              <a:t>10/25/2016</a:t>
             </a:fld>
             <a:endParaRPr lang="en-US"/>
           </a:p>
@@ -1698,7 +1698,7 @@
           <a:p>
             <a:fld id="{78C97017-6FC3-485B-9764-EAC9E56C1D49}" type="datetimeFigureOut">
               <a:rPr lang="en-US" smtClean="0"/>
-              <a:t>10/10/2016</a:t>
+              <a:t>10/25/2016</a:t>
             </a:fld>
             <a:endParaRPr lang="en-US"/>
           </a:p>
@@ -2117,7 +2117,7 @@
           <a:p>
             <a:fld id="{78C97017-6FC3-485B-9764-EAC9E56C1D49}" type="datetimeFigureOut">
               <a:rPr lang="en-US" smtClean="0"/>
-              <a:t>10/10/2016</a:t>
+              <a:t>10/25/2016</a:t>
             </a:fld>
             <a:endParaRPr lang="en-US"/>
           </a:p>
@@ -2234,7 +2234,7 @@
           <a:p>
             <a:fld id="{78C97017-6FC3-485B-9764-EAC9E56C1D49}" type="datetimeFigureOut">
               <a:rPr lang="en-US" smtClean="0"/>
-              <a:t>10/10/2016</a:t>
+              <a:t>10/25/2016</a:t>
             </a:fld>
             <a:endParaRPr lang="en-US"/>
           </a:p>
@@ -2329,7 +2329,7 @@
           <a:p>
             <a:fld id="{78C97017-6FC3-485B-9764-EAC9E56C1D49}" type="datetimeFigureOut">
               <a:rPr lang="en-US" smtClean="0"/>
-              <a:t>10/10/2016</a:t>
+              <a:t>10/25/2016</a:t>
             </a:fld>
             <a:endParaRPr lang="en-US"/>
           </a:p>
@@ -2604,7 +2604,7 @@
           <a:p>
             <a:fld id="{78C97017-6FC3-485B-9764-EAC9E56C1D49}" type="datetimeFigureOut">
               <a:rPr lang="en-US" smtClean="0"/>
-              <a:t>10/10/2016</a:t>
+              <a:t>10/25/2016</a:t>
             </a:fld>
             <a:endParaRPr lang="en-US"/>
           </a:p>
@@ -2856,7 +2856,7 @@
           <a:p>
             <a:fld id="{78C97017-6FC3-485B-9764-EAC9E56C1D49}" type="datetimeFigureOut">
               <a:rPr lang="en-US" smtClean="0"/>
-              <a:t>10/10/2016</a:t>
+              <a:t>10/25/2016</a:t>
             </a:fld>
             <a:endParaRPr lang="en-US"/>
           </a:p>
@@ -3067,7 +3067,7 @@
           <a:p>
             <a:fld id="{78C97017-6FC3-485B-9764-EAC9E56C1D49}" type="datetimeFigureOut">
               <a:rPr lang="en-US" smtClean="0"/>
-              <a:t>10/10/2016</a:t>
+              <a:t>10/25/2016</a:t>
             </a:fld>
             <a:endParaRPr lang="en-US"/>
           </a:p>
@@ -3632,8 +3632,8 @@
         </p:nvCxnSpPr>
         <p:spPr>
           <a:xfrm flipV="1">
-            <a:off x="6477000" y="3204826"/>
-            <a:ext cx="190770" cy="405819"/>
+            <a:off x="6477001" y="3383885"/>
+            <a:ext cx="190769" cy="492176"/>
           </a:xfrm>
           <a:prstGeom prst="bentConnector2">
             <a:avLst/>
@@ -3666,20 +3666,17 @@
       <p:cxnSp>
         <p:nvCxnSpPr>
           <p:cNvPr id="107" name="Elbow Connector 106"/>
-          <p:cNvCxnSpPr>
-            <a:stCxn id="9" idx="1"/>
-          </p:cNvCxnSpPr>
+          <p:cNvCxnSpPr/>
           <p:nvPr/>
         </p:nvCxnSpPr>
         <p:spPr>
           <a:xfrm rot="5400000" flipH="1" flipV="1">
-            <a:off x="4360065" y="1080909"/>
-            <a:ext cx="378691" cy="4637261"/>
-          </a:xfrm>
-          <a:prstGeom prst="bentConnector4">
+            <a:off x="4445272" y="1163325"/>
+            <a:ext cx="192167" cy="4633288"/>
+          </a:xfrm>
+          <a:prstGeom prst="bentConnector3">
             <a:avLst>
-              <a:gd name="adj1" fmla="val -101829"/>
-              <a:gd name="adj2" fmla="val 99976"/>
+              <a:gd name="adj1" fmla="val -291575"/>
             </a:avLst>
           </a:prstGeom>
           <a:ln w="19050">
@@ -3835,8 +3832,8 @@
         </p:nvCxnSpPr>
         <p:spPr>
           <a:xfrm flipV="1">
-            <a:off x="6667770" y="2632344"/>
-            <a:ext cx="1612" cy="225722"/>
+            <a:off x="6667770" y="2332975"/>
+            <a:ext cx="1612" cy="704150"/>
           </a:xfrm>
           <a:prstGeom prst="straightConnector1">
             <a:avLst/>
@@ -3915,7 +3912,7 @@
         </p:nvSpPr>
         <p:spPr>
           <a:xfrm rot="5400000" flipV="1">
-            <a:off x="6253986" y="3522883"/>
+            <a:off x="6253987" y="3788299"/>
             <a:ext cx="270504" cy="175523"/>
           </a:xfrm>
           <a:prstGeom prst="triangle">
@@ -4237,7 +4234,7 @@
         </p:nvSpPr>
         <p:spPr>
           <a:xfrm>
-            <a:off x="4487017" y="2847371"/>
+            <a:off x="4487017" y="3026430"/>
             <a:ext cx="1156969" cy="346760"/>
           </a:xfrm>
           <a:prstGeom prst="rect">
@@ -4344,7 +4341,7 @@
         <p:spPr>
           <a:xfrm>
             <a:off x="4220351" y="2760681"/>
-            <a:ext cx="266666" cy="260070"/>
+            <a:ext cx="266666" cy="439129"/>
           </a:xfrm>
           <a:prstGeom prst="bentConnector3">
             <a:avLst/>
@@ -4381,7 +4378,7 @@
         </p:nvSpPr>
         <p:spPr>
           <a:xfrm>
-            <a:off x="4503204" y="2280569"/>
+            <a:off x="4503204" y="1981200"/>
             <a:ext cx="1156969" cy="346760"/>
           </a:xfrm>
           <a:prstGeom prst="rect">
@@ -4440,12 +4437,12 @@
         </p:nvCxnSpPr>
         <p:spPr>
           <a:xfrm flipV="1">
-            <a:off x="4220351" y="2453949"/>
-            <a:ext cx="282853" cy="306732"/>
+            <a:off x="4220351" y="2154580"/>
+            <a:ext cx="282853" cy="606101"/>
           </a:xfrm>
           <a:prstGeom prst="bentConnector3">
             <a:avLst>
-              <a:gd name="adj1" fmla="val 50000"/>
+              <a:gd name="adj1" fmla="val 47054"/>
             </a:avLst>
           </a:prstGeom>
           <a:ln w="19050">
@@ -4480,7 +4477,7 @@
         </p:nvSpPr>
         <p:spPr>
           <a:xfrm>
-            <a:off x="6313677" y="2858066"/>
+            <a:off x="6313677" y="3037125"/>
             <a:ext cx="708186" cy="346760"/>
           </a:xfrm>
           <a:prstGeom prst="rect">
@@ -4536,7 +4533,7 @@
         </p:nvSpPr>
         <p:spPr>
           <a:xfrm>
-            <a:off x="5643227" y="2943979"/>
+            <a:off x="5643227" y="3123038"/>
             <a:ext cx="236048" cy="173380"/>
           </a:xfrm>
           <a:prstGeom prst="flowChartDecision">
@@ -4584,7 +4581,7 @@
         </p:nvCxnSpPr>
         <p:spPr>
           <a:xfrm>
-            <a:off x="5879275" y="3030669"/>
+            <a:off x="5879275" y="3209728"/>
             <a:ext cx="434402" cy="777"/>
           </a:xfrm>
           <a:prstGeom prst="bentConnector3">
@@ -4622,7 +4619,7 @@
         </p:nvSpPr>
         <p:spPr>
           <a:xfrm>
-            <a:off x="6315289" y="2285584"/>
+            <a:off x="6315289" y="1986215"/>
             <a:ext cx="708186" cy="346760"/>
           </a:xfrm>
           <a:prstGeom prst="rect">
@@ -4678,7 +4675,7 @@
         </p:nvSpPr>
         <p:spPr>
           <a:xfrm>
-            <a:off x="5672547" y="2371497"/>
+            <a:off x="5672547" y="2072128"/>
             <a:ext cx="236048" cy="173380"/>
           </a:xfrm>
           <a:prstGeom prst="flowChartDecision">
@@ -4726,7 +4723,7 @@
         </p:nvCxnSpPr>
         <p:spPr>
           <a:xfrm>
-            <a:off x="5908595" y="2458187"/>
+            <a:off x="5908595" y="2158818"/>
             <a:ext cx="406694" cy="777"/>
           </a:xfrm>
           <a:prstGeom prst="bentConnector3">
@@ -4764,7 +4761,7 @@
         </p:nvSpPr>
         <p:spPr>
           <a:xfrm>
-            <a:off x="5128257" y="3429000"/>
+            <a:off x="5128258" y="3694416"/>
             <a:ext cx="1156969" cy="346760"/>
           </a:xfrm>
           <a:prstGeom prst="rect">
@@ -4835,7 +4832,7 @@
         </p:nvSpPr>
         <p:spPr>
           <a:xfrm>
-            <a:off x="7634974" y="2190302"/>
+            <a:off x="7634974" y="2369361"/>
             <a:ext cx="822002" cy="285783"/>
           </a:xfrm>
           <a:prstGeom prst="rect">
@@ -4891,7 +4888,7 @@
         </p:nvSpPr>
         <p:spPr>
           <a:xfrm>
-            <a:off x="7041947" y="2948201"/>
+            <a:off x="7041947" y="3127260"/>
             <a:ext cx="236048" cy="173380"/>
           </a:xfrm>
           <a:prstGeom prst="flowChartDecision">
@@ -4941,7 +4938,7 @@
         </p:nvCxnSpPr>
         <p:spPr>
           <a:xfrm flipV="1">
-            <a:off x="7277995" y="2333194"/>
+            <a:off x="7277995" y="2512253"/>
             <a:ext cx="356979" cy="701697"/>
           </a:xfrm>
           <a:prstGeom prst="bentConnector3">
@@ -4979,7 +4976,7 @@
         </p:nvSpPr>
         <p:spPr>
           <a:xfrm>
-            <a:off x="7634974" y="2541359"/>
+            <a:off x="7634974" y="2720418"/>
             <a:ext cx="822003" cy="285783"/>
           </a:xfrm>
           <a:prstGeom prst="rect">
@@ -5038,7 +5035,7 @@
         </p:nvCxnSpPr>
         <p:spPr>
           <a:xfrm flipV="1">
-            <a:off x="7277995" y="2684251"/>
+            <a:off x="7277995" y="2863310"/>
             <a:ext cx="356979" cy="350640"/>
           </a:xfrm>
           <a:prstGeom prst="bentConnector3">
@@ -5076,7 +5073,7 @@
         </p:nvSpPr>
         <p:spPr>
           <a:xfrm>
-            <a:off x="7634638" y="2892465"/>
+            <a:off x="7634638" y="3071524"/>
             <a:ext cx="823562" cy="285783"/>
           </a:xfrm>
           <a:prstGeom prst="rect">
@@ -5135,7 +5132,7 @@
         </p:nvCxnSpPr>
         <p:spPr>
           <a:xfrm>
-            <a:off x="7277995" y="3034891"/>
+            <a:off x="7277995" y="3213950"/>
             <a:ext cx="356643" cy="466"/>
           </a:xfrm>
           <a:prstGeom prst="bentConnector3">
@@ -5173,7 +5170,7 @@
         </p:nvSpPr>
         <p:spPr>
           <a:xfrm>
-            <a:off x="7632709" y="3237271"/>
+            <a:off x="7632709" y="3416330"/>
             <a:ext cx="822003" cy="285783"/>
           </a:xfrm>
           <a:prstGeom prst="rect">
@@ -5232,7 +5229,7 @@
         </p:nvCxnSpPr>
         <p:spPr>
           <a:xfrm>
-            <a:off x="7277995" y="3034891"/>
+            <a:off x="7277995" y="3213950"/>
             <a:ext cx="354714" cy="345272"/>
           </a:xfrm>
           <a:prstGeom prst="bentConnector3">
@@ -5432,7 +5429,7 @@
         </p:nvSpPr>
         <p:spPr>
           <a:xfrm rot="16200000">
-            <a:off x="6581354" y="3514530"/>
+            <a:off x="6527537" y="3693589"/>
             <a:ext cx="881018" cy="261610"/>
           </a:xfrm>
           <a:prstGeom prst="rect">
@@ -5584,7 +5581,7 @@
         </p:nvSpPr>
         <p:spPr>
           <a:xfrm>
-            <a:off x="7634621" y="3581400"/>
+            <a:off x="7634621" y="3760459"/>
             <a:ext cx="822003" cy="285783"/>
           </a:xfrm>
           <a:prstGeom prst="rect">
@@ -5643,7 +5640,7 @@
         </p:nvCxnSpPr>
         <p:spPr>
           <a:xfrm>
-            <a:off x="7277995" y="3034891"/>
+            <a:off x="7277995" y="3213950"/>
             <a:ext cx="356626" cy="689401"/>
           </a:xfrm>
           <a:prstGeom prst="bentConnector3">
@@ -5675,6 +5672,280 @@
           </a:fontRef>
         </p:style>
       </p:cxnSp>
+      <p:sp>
+        <p:nvSpPr>
+          <p:cNvPr id="3" name="TextBox 2"/>
+          <p:cNvSpPr txBox="1"/>
+          <p:nvPr/>
+        </p:nvSpPr>
+        <p:spPr>
+          <a:xfrm>
+            <a:off x="6640024" y="2295469"/>
+            <a:ext cx="304800" cy="253916"/>
+          </a:xfrm>
+          <a:prstGeom prst="rect">
+            <a:avLst/>
+          </a:prstGeom>
+          <a:noFill/>
+        </p:spPr>
+        <p:txBody>
+          <a:bodyPr wrap="square" rtlCol="0">
+            <a:spAutoFit/>
+          </a:bodyPr>
+          <a:lstStyle/>
+          <a:p>
+            <a:r>
+              <a:rPr lang="en-SG" sz="1050" dirty="0">
+                <a:solidFill>
+                  <a:srgbClr val="7030A0"/>
+                </a:solidFill>
+              </a:rPr>
+              <a:t>*</a:t>
+            </a:r>
+          </a:p>
+        </p:txBody>
+      </p:sp>
+      <p:sp>
+        <p:nvSpPr>
+          <p:cNvPr id="54" name="TextBox 53"/>
+          <p:cNvSpPr txBox="1"/>
+          <p:nvPr/>
+        </p:nvSpPr>
+        <p:spPr>
+          <a:xfrm>
+            <a:off x="6454769" y="2861193"/>
+            <a:ext cx="304800" cy="253916"/>
+          </a:xfrm>
+          <a:prstGeom prst="rect">
+            <a:avLst/>
+          </a:prstGeom>
+          <a:noFill/>
+        </p:spPr>
+        <p:txBody>
+          <a:bodyPr wrap="square" rtlCol="0">
+            <a:spAutoFit/>
+          </a:bodyPr>
+          <a:lstStyle/>
+          <a:p>
+            <a:r>
+              <a:rPr lang="en-SG" sz="1050" dirty="0">
+                <a:solidFill>
+                  <a:srgbClr val="7030A0"/>
+                </a:solidFill>
+              </a:rPr>
+              <a:t>*</a:t>
+            </a:r>
+          </a:p>
+        </p:txBody>
+      </p:sp>
+      <p:sp>
+        <p:nvSpPr>
+          <p:cNvPr id="56" name="TextBox 55"/>
+          <p:cNvSpPr txBox="1"/>
+          <p:nvPr/>
+        </p:nvSpPr>
+        <p:spPr>
+          <a:xfrm>
+            <a:off x="6114564" y="2980245"/>
+            <a:ext cx="304800" cy="253916"/>
+          </a:xfrm>
+          <a:prstGeom prst="rect">
+            <a:avLst/>
+          </a:prstGeom>
+          <a:noFill/>
+        </p:spPr>
+        <p:txBody>
+          <a:bodyPr wrap="square" rtlCol="0">
+            <a:spAutoFit/>
+          </a:bodyPr>
+          <a:lstStyle/>
+          <a:p>
+            <a:r>
+              <a:rPr lang="en-SG" sz="1050" dirty="0">
+                <a:solidFill>
+                  <a:srgbClr val="7030A0"/>
+                </a:solidFill>
+              </a:rPr>
+              <a:t>*</a:t>
+            </a:r>
+          </a:p>
+        </p:txBody>
+      </p:sp>
+      <p:sp>
+        <p:nvSpPr>
+          <p:cNvPr id="60" name="TextBox 59"/>
+          <p:cNvSpPr txBox="1"/>
+          <p:nvPr/>
+        </p:nvSpPr>
+        <p:spPr>
+          <a:xfrm>
+            <a:off x="6119272" y="1951158"/>
+            <a:ext cx="304800" cy="253916"/>
+          </a:xfrm>
+          <a:prstGeom prst="rect">
+            <a:avLst/>
+          </a:prstGeom>
+          <a:noFill/>
+        </p:spPr>
+        <p:txBody>
+          <a:bodyPr wrap="square" rtlCol="0">
+            <a:spAutoFit/>
+          </a:bodyPr>
+          <a:lstStyle/>
+          <a:p>
+            <a:r>
+              <a:rPr lang="en-SG" sz="1050" dirty="0">
+                <a:solidFill>
+                  <a:srgbClr val="7030A0"/>
+                </a:solidFill>
+              </a:rPr>
+              <a:t>*</a:t>
+            </a:r>
+          </a:p>
+        </p:txBody>
+      </p:sp>
+      <p:sp>
+        <p:nvSpPr>
+          <p:cNvPr id="61" name="TextBox 60"/>
+          <p:cNvSpPr txBox="1"/>
+          <p:nvPr/>
+        </p:nvSpPr>
+        <p:spPr>
+          <a:xfrm rot="16200000">
+            <a:off x="6380877" y="2451157"/>
+            <a:ext cx="924065" cy="338554"/>
+          </a:xfrm>
+          <a:prstGeom prst="rect">
+            <a:avLst/>
+          </a:prstGeom>
+          <a:noFill/>
+        </p:spPr>
+        <p:txBody>
+          <a:bodyPr wrap="square" rtlCol="0">
+            <a:spAutoFit/>
+          </a:bodyPr>
+          <a:lstStyle/>
+          <a:p>
+            <a:r>
+              <a:rPr lang="en-SG" sz="800" dirty="0">
+                <a:solidFill>
+                  <a:srgbClr val="7030A0"/>
+                </a:solidFill>
+              </a:rPr>
+              <a:t>Categorised </a:t>
+            </a:r>
+          </a:p>
+          <a:p>
+            <a:r>
+              <a:rPr lang="en-SG" sz="800" dirty="0">
+                <a:solidFill>
+                  <a:srgbClr val="7030A0"/>
+                </a:solidFill>
+              </a:rPr>
+              <a:t>by &gt;</a:t>
+            </a:r>
+          </a:p>
+        </p:txBody>
+      </p:sp>
+      <p:sp>
+        <p:nvSpPr>
+          <p:cNvPr id="65" name="TextBox 64"/>
+          <p:cNvSpPr txBox="1"/>
+          <p:nvPr/>
+        </p:nvSpPr>
+        <p:spPr>
+          <a:xfrm rot="16200000">
+            <a:off x="5939043" y="2314704"/>
+            <a:ext cx="1138573" cy="215444"/>
+          </a:xfrm>
+          <a:prstGeom prst="rect">
+            <a:avLst/>
+          </a:prstGeom>
+          <a:noFill/>
+        </p:spPr>
+        <p:txBody>
+          <a:bodyPr wrap="square" rtlCol="0">
+            <a:spAutoFit/>
+          </a:bodyPr>
+          <a:lstStyle/>
+          <a:p>
+            <a:r>
+              <a:rPr lang="en-SG" sz="800" dirty="0">
+                <a:solidFill>
+                  <a:srgbClr val="7030A0"/>
+                </a:solidFill>
+              </a:rPr>
+              <a:t>&lt; Utilised by</a:t>
+            </a:r>
+          </a:p>
+        </p:txBody>
+      </p:sp>
+      <p:sp>
+        <p:nvSpPr>
+          <p:cNvPr id="88" name="TextBox 87"/>
+          <p:cNvSpPr txBox="1"/>
+          <p:nvPr/>
+        </p:nvSpPr>
+        <p:spPr>
+          <a:xfrm>
+            <a:off x="5590891" y="3268920"/>
+            <a:ext cx="304800" cy="230832"/>
+          </a:xfrm>
+          <a:prstGeom prst="rect">
+            <a:avLst/>
+          </a:prstGeom>
+          <a:noFill/>
+        </p:spPr>
+        <p:txBody>
+          <a:bodyPr wrap="square" rtlCol="0">
+            <a:spAutoFit/>
+          </a:bodyPr>
+          <a:lstStyle/>
+          <a:p>
+            <a:r>
+              <a:rPr lang="en-SG" sz="900" dirty="0">
+                <a:solidFill>
+                  <a:srgbClr val="7030A0"/>
+                </a:solidFill>
+              </a:rPr>
+              <a:t>1</a:t>
+            </a:r>
+          </a:p>
+        </p:txBody>
+      </p:sp>
+      <p:sp>
+        <p:nvSpPr>
+          <p:cNvPr id="89" name="TextBox 88"/>
+          <p:cNvSpPr txBox="1"/>
+          <p:nvPr/>
+        </p:nvSpPr>
+        <p:spPr>
+          <a:xfrm>
+            <a:off x="5607191" y="2212388"/>
+            <a:ext cx="304800" cy="230832"/>
+          </a:xfrm>
+          <a:prstGeom prst="rect">
+            <a:avLst/>
+          </a:prstGeom>
+          <a:noFill/>
+        </p:spPr>
+        <p:txBody>
+          <a:bodyPr wrap="square" rtlCol="0">
+            <a:spAutoFit/>
+          </a:bodyPr>
+          <a:lstStyle/>
+          <a:p>
+            <a:r>
+              <a:rPr lang="en-SG" sz="900" dirty="0">
+                <a:solidFill>
+                  <a:srgbClr val="7030A0"/>
+                </a:solidFill>
+              </a:rPr>
+              <a:t>1</a:t>
+            </a:r>
+          </a:p>
+        </p:txBody>
+      </p:sp>
     </p:spTree>
     <p:extLst>
       <p:ext uri="{BB962C8B-B14F-4D97-AF65-F5344CB8AC3E}">

</xml_diff>